<commit_message>
#13 Updating lab diagrams and WDS
</commit_message>
<xml_diff>
--- a/Whiteboard design session/WDS trainer presentation - Innovate and modernize apps with Data and AI.pptx
+++ b/Whiteboard design session/WDS trainer presentation - Innovate and modernize apps with Data and AI.pptx
@@ -6,7 +6,7 @@
     <p:sldMasterId id="2147483665" r:id="rId5"/>
   </p:sldMasterIdLst>
   <p:notesMasterIdLst>
-    <p:notesMasterId r:id="rId30"/>
+    <p:notesMasterId r:id="rId32"/>
   </p:notesMasterIdLst>
   <p:sldIdLst>
     <p:sldId id="300" r:id="rId6"/>
@@ -24,15 +24,17 @@
     <p:sldId id="321" r:id="rId18"/>
     <p:sldId id="317" r:id="rId19"/>
     <p:sldId id="316" r:id="rId20"/>
-    <p:sldId id="319" r:id="rId21"/>
-    <p:sldId id="333" r:id="rId22"/>
-    <p:sldId id="334" r:id="rId23"/>
-    <p:sldId id="332" r:id="rId24"/>
-    <p:sldId id="329" r:id="rId25"/>
-    <p:sldId id="330" r:id="rId26"/>
-    <p:sldId id="328" r:id="rId27"/>
-    <p:sldId id="331" r:id="rId28"/>
-    <p:sldId id="315" r:id="rId29"/>
+    <p:sldId id="335" r:id="rId21"/>
+    <p:sldId id="319" r:id="rId22"/>
+    <p:sldId id="333" r:id="rId23"/>
+    <p:sldId id="336" r:id="rId24"/>
+    <p:sldId id="334" r:id="rId25"/>
+    <p:sldId id="332" r:id="rId26"/>
+    <p:sldId id="329" r:id="rId27"/>
+    <p:sldId id="330" r:id="rId28"/>
+    <p:sldId id="328" r:id="rId29"/>
+    <p:sldId id="331" r:id="rId30"/>
+    <p:sldId id="315" r:id="rId31"/>
   </p:sldIdLst>
   <p:sldSz cx="12192000" cy="6858000"/>
   <p:notesSz cx="6858000" cy="9144000"/>
@@ -230,7 +232,7 @@
           <a:p>
             <a:fld id="{52A13B17-C506-4D51-BB37-16B365906619}" type="datetimeFigureOut">
               <a:rPr lang="en-US" smtClean="0"/>
-              <a:t>9/8/2020</a:t>
+              <a:t>10/23/2021</a:t>
             </a:fld>
             <a:endParaRPr lang="en-US"/>
           </a:p>
@@ -1424,7 +1426,56 @@
           <a:bodyPr/>
           <a:lstStyle/>
           <a:p>
-            <a:endParaRPr lang="en-US"/>
+            <a:r>
+              <a:rPr lang="en-US" b="0" dirty="0">
+                <a:solidFill>
+                  <a:srgbClr val="000000"/>
+                </a:solidFill>
+                <a:effectLst/>
+                <a:latin typeface="Consolas" panose="020B0609020204030204" pitchFamily="49" charset="0"/>
+              </a:rPr>
+              <a:t>The solution begins with multiple IoT devices, located within multiple factories, that securely connect to Azure IoT Hub to send telemetry. IoT Hub provides IoT device management, telemetry ingest at high volume, and the ability to send commands to devices as needed. IoT Edge allows individual manufacturing machines to interact with IoT Hub by sending telemetry messages to IoT Hub and by ensuring that edge devices are running the latest versions of deployed modules. Telemetry from IoT Hub automatically triggers an Azure function, which processes the events, assigns a unique </a:t>
+            </a:r>
+            <a:r>
+              <a:rPr lang="en-US" b="0" dirty="0">
+                <a:solidFill>
+                  <a:srgbClr val="800000"/>
+                </a:solidFill>
+                <a:effectLst/>
+                <a:latin typeface="Consolas" panose="020B0609020204030204" pitchFamily="49" charset="0"/>
+              </a:rPr>
+              <a:t>`</a:t>
+            </a:r>
+            <a:r>
+              <a:rPr lang="en-US" b="0" dirty="0" err="1">
+                <a:solidFill>
+                  <a:srgbClr val="800000"/>
+                </a:solidFill>
+                <a:effectLst/>
+                <a:latin typeface="Consolas" panose="020B0609020204030204" pitchFamily="49" charset="0"/>
+              </a:rPr>
+              <a:t>entity_id</a:t>
+            </a:r>
+            <a:r>
+              <a:rPr lang="en-US" b="0" dirty="0">
+                <a:solidFill>
+                  <a:srgbClr val="800000"/>
+                </a:solidFill>
+                <a:effectLst/>
+                <a:latin typeface="Consolas" panose="020B0609020204030204" pitchFamily="49" charset="0"/>
+              </a:rPr>
+              <a:t>`</a:t>
+            </a:r>
+            <a:r>
+              <a:rPr lang="en-US" b="0" dirty="0">
+                <a:solidFill>
+                  <a:srgbClr val="000000"/>
+                </a:solidFill>
+                <a:effectLst/>
+                <a:latin typeface="Consolas" panose="020B0609020204030204" pitchFamily="49" charset="0"/>
+              </a:rPr>
+              <a:t>, and stores them in an Azure Cosmos DB telemetry container. The document TTL (time-to-live) is set to 30 days, after which time they will automatically expire. The data is replicated long-term to the analytical store with no TTL. The analytical store saves all transactional data in columnar storage in a cost-effective way, automatically, with no ETL required.</a:t>
+            </a:r>
           </a:p>
         </p:txBody>
       </p:sp>
@@ -1454,7 +1505,7 @@
     </p:spTree>
     <p:extLst>
       <p:ext uri="{BB962C8B-B14F-4D97-AF65-F5344CB8AC3E}">
-        <p14:creationId xmlns:p14="http://schemas.microsoft.com/office/powerpoint/2010/main" val="4115832635"/>
+        <p14:creationId xmlns:p14="http://schemas.microsoft.com/office/powerpoint/2010/main" val="3099048570"/>
       </p:ext>
     </p:extLst>
   </p:cSld>
@@ -1508,7 +1559,33 @@
           <a:bodyPr/>
           <a:lstStyle/>
           <a:p>
-            <a:endParaRPr lang="en-US"/>
+            <a:pPr marL="0" marR="0" lvl="0" indent="0" algn="l" defTabSz="914400" rtl="0" eaLnBrk="1" fontAlgn="auto" latinLnBrk="0" hangingPunct="1">
+              <a:lnSpc>
+                <a:spcPct val="100000"/>
+              </a:lnSpc>
+              <a:spcBef>
+                <a:spcPts val="0"/>
+              </a:spcBef>
+              <a:spcAft>
+                <a:spcPts val="0"/>
+              </a:spcAft>
+              <a:buClrTx/>
+              <a:buSzTx/>
+              <a:buFontTx/>
+              <a:buNone/>
+              <a:tabLst/>
+              <a:defRPr/>
+            </a:pPr>
+            <a:r>
+              <a:rPr lang="en-US" b="0" dirty="0">
+                <a:solidFill>
+                  <a:srgbClr val="000000"/>
+                </a:solidFill>
+                <a:effectLst/>
+                <a:latin typeface="Consolas" panose="020B0609020204030204" pitchFamily="49" charset="0"/>
+              </a:rPr>
+              <a:t>A different Azure function implements event sourcing by triggering off the Azure Cosmos DB change feed for additional processing, including predictive maintenance scoring via a custom-trained Machine Learning model deployed to Azure Kubernetes Service (AKS) for real-time scoring.</a:t>
+            </a:r>
           </a:p>
         </p:txBody>
       </p:sp>
@@ -1538,7 +1615,7 @@
     </p:spTree>
     <p:extLst>
       <p:ext uri="{BB962C8B-B14F-4D97-AF65-F5344CB8AC3E}">
-        <p14:creationId xmlns:p14="http://schemas.microsoft.com/office/powerpoint/2010/main" val="571832029"/>
+        <p14:creationId xmlns:p14="http://schemas.microsoft.com/office/powerpoint/2010/main" val="4115832635"/>
       </p:ext>
     </p:extLst>
   </p:cSld>
@@ -1592,7 +1669,116 @@
           <a:bodyPr/>
           <a:lstStyle/>
           <a:p>
-            <a:endParaRPr lang="en-US"/>
+            <a:pPr marL="0" marR="0" lvl="0" indent="0" algn="l" defTabSz="914400" rtl="0" eaLnBrk="1" fontAlgn="auto" latinLnBrk="0" hangingPunct="1">
+              <a:lnSpc>
+                <a:spcPct val="100000"/>
+              </a:lnSpc>
+              <a:spcBef>
+                <a:spcPts val="0"/>
+              </a:spcBef>
+              <a:spcAft>
+                <a:spcPts val="0"/>
+              </a:spcAft>
+              <a:buClrTx/>
+              <a:buSzTx/>
+              <a:buFontTx/>
+              <a:buNone/>
+              <a:tabLst/>
+              <a:defRPr/>
+            </a:pPr>
+            <a:r>
+              <a:rPr lang="en-US" b="0" dirty="0">
+                <a:solidFill>
+                  <a:srgbClr val="000000"/>
+                </a:solidFill>
+                <a:effectLst/>
+                <a:latin typeface="Consolas" panose="020B0609020204030204" pitchFamily="49" charset="0"/>
+              </a:rPr>
+              <a:t>The function sends the scored data to an Azure Event Hub. Another function that consumes the change feed and saves the event data to domain entities, including state data. This database stores all sensor data as domain entities, partitioned by device Id, which the Hyperscale features uses to automatically shard the data for horizontal scaling and high performance reads and writes. An Azure Stream Analytics job reads the device telemetry, which includes the predictive maintenance prediction, and applies additional processing through a SQL-like query language. It uses an Azure Cognitive Services Anomaly Detector service to perform Changepoint and Spike-and-Dip anomaly detection. It also performs windowed aggregate queries against the time series data to create aggregates on machine maintenance predictions, grouped by maintenance requirement, factory, and machine. The temperature anomalies, telemetry with predictive maintenance scores, and temperature anomaly data is saved to another Azure Cosmos DB container, named </a:t>
+            </a:r>
+            <a:r>
+              <a:rPr lang="en-US" b="0" dirty="0">
+                <a:solidFill>
+                  <a:srgbClr val="800000"/>
+                </a:solidFill>
+                <a:effectLst/>
+                <a:latin typeface="Consolas" panose="020B0609020204030204" pitchFamily="49" charset="0"/>
+              </a:rPr>
+              <a:t>`</a:t>
+            </a:r>
+            <a:r>
+              <a:rPr lang="en-US" b="0" dirty="0" err="1">
+                <a:solidFill>
+                  <a:srgbClr val="800000"/>
+                </a:solidFill>
+                <a:effectLst/>
+                <a:latin typeface="Consolas" panose="020B0609020204030204" pitchFamily="49" charset="0"/>
+              </a:rPr>
+              <a:t>scored_telemetry</a:t>
+            </a:r>
+            <a:r>
+              <a:rPr lang="en-US" b="0" dirty="0">
+                <a:solidFill>
+                  <a:srgbClr val="800000"/>
+                </a:solidFill>
+                <a:effectLst/>
+                <a:latin typeface="Consolas" panose="020B0609020204030204" pitchFamily="49" charset="0"/>
+              </a:rPr>
+              <a:t>`</a:t>
+            </a:r>
+            <a:r>
+              <a:rPr lang="en-US" b="0" dirty="0">
+                <a:solidFill>
+                  <a:srgbClr val="000000"/>
+                </a:solidFill>
+                <a:effectLst/>
+                <a:latin typeface="Consolas" panose="020B0609020204030204" pitchFamily="49" charset="0"/>
+              </a:rPr>
+              <a:t>. Another Azure function implements event sourcing by triggering off the Azure Cosmos DB change feed from the </a:t>
+            </a:r>
+            <a:r>
+              <a:rPr lang="en-US" b="0" dirty="0">
+                <a:solidFill>
+                  <a:srgbClr val="800000"/>
+                </a:solidFill>
+                <a:effectLst/>
+                <a:latin typeface="Consolas" panose="020B0609020204030204" pitchFamily="49" charset="0"/>
+              </a:rPr>
+              <a:t>`</a:t>
+            </a:r>
+            <a:r>
+              <a:rPr lang="en-US" b="0" dirty="0" err="1">
+                <a:solidFill>
+                  <a:srgbClr val="800000"/>
+                </a:solidFill>
+                <a:effectLst/>
+                <a:latin typeface="Consolas" panose="020B0609020204030204" pitchFamily="49" charset="0"/>
+              </a:rPr>
+              <a:t>scored_telemetry</a:t>
+            </a:r>
+            <a:r>
+              <a:rPr lang="en-US" b="0" dirty="0">
+                <a:solidFill>
+                  <a:srgbClr val="800000"/>
+                </a:solidFill>
+                <a:effectLst/>
+                <a:latin typeface="Consolas" panose="020B0609020204030204" pitchFamily="49" charset="0"/>
+              </a:rPr>
+              <a:t>`</a:t>
+            </a:r>
+            <a:r>
+              <a:rPr lang="en-US" b="0" dirty="0">
+                <a:solidFill>
+                  <a:srgbClr val="000000"/>
+                </a:solidFill>
+                <a:effectLst/>
+                <a:latin typeface="Consolas" panose="020B0609020204030204" pitchFamily="49" charset="0"/>
+              </a:rPr>
+              <a:t> container. It saves the anomaly detection, windowed aggregates, and scored predictive maintenance event data to domain entities, including state data, and writes them to Cosmos DB.</a:t>
+            </a:r>
+          </a:p>
+          <a:p>
+            <a:endParaRPr lang="en-US" dirty="0"/>
           </a:p>
         </p:txBody>
       </p:sp>
@@ -1622,7 +1808,7 @@
     </p:spTree>
     <p:extLst>
       <p:ext uri="{BB962C8B-B14F-4D97-AF65-F5344CB8AC3E}">
-        <p14:creationId xmlns:p14="http://schemas.microsoft.com/office/powerpoint/2010/main" val="2126623039"/>
+        <p14:creationId xmlns:p14="http://schemas.microsoft.com/office/powerpoint/2010/main" val="571832029"/>
       </p:ext>
     </p:extLst>
   </p:cSld>
@@ -1676,7 +1862,36 @@
           <a:bodyPr/>
           <a:lstStyle/>
           <a:p>
-            <a:endParaRPr lang="en-US"/>
+            <a:pPr marL="0" marR="0" lvl="0" indent="0" algn="l" defTabSz="914400" rtl="0" eaLnBrk="1" fontAlgn="auto" latinLnBrk="0" hangingPunct="1">
+              <a:lnSpc>
+                <a:spcPct val="100000"/>
+              </a:lnSpc>
+              <a:spcBef>
+                <a:spcPts val="0"/>
+              </a:spcBef>
+              <a:spcAft>
+                <a:spcPts val="0"/>
+              </a:spcAft>
+              <a:buClrTx/>
+              <a:buSzTx/>
+              <a:buFontTx/>
+              <a:buNone/>
+              <a:tabLst/>
+              <a:defRPr/>
+            </a:pPr>
+            <a:r>
+              <a:rPr lang="en-US" b="0" dirty="0">
+                <a:solidFill>
+                  <a:srgbClr val="000000"/>
+                </a:solidFill>
+                <a:effectLst/>
+                <a:latin typeface="Consolas" panose="020B0609020204030204" pitchFamily="49" charset="0"/>
+              </a:rPr>
+              <a:t>An Azure Synapse Analytics workspace securely connects to Azure Cosmos DB through a linked service, and uses the Synapse Link feature to access both the transactional store (OLTP) and analytical store (OLAP) of each Azure Cosmos DB container. The analytical store is optimized for read-heavy queries, which do not consume Azure Cosmos DB resource units (RUs), as opposed to reading the transactional store. All raw historical event data is accessible through the analytical store, which serves as the data lake, but with no ETL requirements. Synapse Spark notebooks read the analytical store to perform Machine Learning model training and deployments through Azure Machine Learning, data exploration, and batch scoring. Synapse pipelines are used for batch processing at scale over data fed into the analytical store from IoT devices originating from all factories. Wide World Importers data analysts use the Power BI integration capabilities of Synapse Analytics to create reports against Synapse Serverless views that display data from the analytical stores, as well as data stored in the SQL Pools. These reports are also embedded in the web application, making them available to end-users who do not have access to the Synapse Analytics workspace or Power BI online.</a:t>
+            </a:r>
+          </a:p>
+          <a:p>
+            <a:endParaRPr lang="en-US" dirty="0"/>
           </a:p>
         </p:txBody>
       </p:sp>
@@ -1706,7 +1921,7 @@
     </p:spTree>
     <p:extLst>
       <p:ext uri="{BB962C8B-B14F-4D97-AF65-F5344CB8AC3E}">
-        <p14:creationId xmlns:p14="http://schemas.microsoft.com/office/powerpoint/2010/main" val="1590212331"/>
+        <p14:creationId xmlns:p14="http://schemas.microsoft.com/office/powerpoint/2010/main" val="1371226332"/>
       </p:ext>
     </p:extLst>
   </p:cSld>
@@ -1856,7 +2071,56 @@
           <a:bodyPr/>
           <a:lstStyle/>
           <a:p>
-            <a:endParaRPr lang="en-US"/>
+            <a:pPr marL="0" marR="0" lvl="0" indent="0" algn="l" defTabSz="914400" rtl="0" eaLnBrk="1" fontAlgn="auto" latinLnBrk="0" hangingPunct="1">
+              <a:lnSpc>
+                <a:spcPct val="100000"/>
+              </a:lnSpc>
+              <a:spcBef>
+                <a:spcPts val="0"/>
+              </a:spcBef>
+              <a:spcAft>
+                <a:spcPts val="0"/>
+              </a:spcAft>
+              <a:buClrTx/>
+              <a:buSzTx/>
+              <a:buFontTx/>
+              <a:buNone/>
+              <a:tabLst/>
+              <a:defRPr/>
+            </a:pPr>
+            <a:r>
+              <a:rPr lang="en-US" b="0" dirty="0">
+                <a:solidFill>
+                  <a:srgbClr val="000000"/>
+                </a:solidFill>
+                <a:effectLst/>
+                <a:latin typeface="Consolas" panose="020B0609020204030204" pitchFamily="49" charset="0"/>
+              </a:rPr>
+              <a:t>The web app is a modernized version of WWI's old monolithic web app, implementing a microservices pattern through Docker containers deployed to Azure. The CQRS pattern is applied by separating create, update, and delete (CUD) commands from query (read) commands, issued by microservices deployed to different containers. The metadata command microservice, for example, issues CUD commands to the </a:t>
+            </a:r>
+            <a:r>
+              <a:rPr lang="en-US" b="0" dirty="0">
+                <a:solidFill>
+                  <a:srgbClr val="800000"/>
+                </a:solidFill>
+                <a:effectLst/>
+                <a:latin typeface="Consolas" panose="020B0609020204030204" pitchFamily="49" charset="0"/>
+              </a:rPr>
+              <a:t>`metadata`</a:t>
+            </a:r>
+            <a:r>
+              <a:rPr lang="en-US" b="0" dirty="0">
+                <a:solidFill>
+                  <a:srgbClr val="000000"/>
+                </a:solidFill>
+                <a:effectLst/>
+                <a:latin typeface="Consolas" panose="020B0609020204030204" pitchFamily="49" charset="0"/>
+              </a:rPr>
+              <a:t> Azure Cosmos DB container. Factory, machine, maintenance criteria, and other metadata are stored in this container. A query microservice issues read requests to read microservices for telemetry and metadata from Azure Cosmos DB.</a:t>
+            </a:r>
+          </a:p>
+          <a:p>
+            <a:endParaRPr lang="en-US" dirty="0"/>
           </a:p>
         </p:txBody>
       </p:sp>
@@ -1886,7 +2150,7 @@
     </p:spTree>
     <p:extLst>
       <p:ext uri="{BB962C8B-B14F-4D97-AF65-F5344CB8AC3E}">
-        <p14:creationId xmlns:p14="http://schemas.microsoft.com/office/powerpoint/2010/main" val="726796885"/>
+        <p14:creationId xmlns:p14="http://schemas.microsoft.com/office/powerpoint/2010/main" val="2126623039"/>
       </p:ext>
     </p:extLst>
   </p:cSld>
@@ -1970,7 +2234,7 @@
     </p:spTree>
     <p:extLst>
       <p:ext uri="{BB962C8B-B14F-4D97-AF65-F5344CB8AC3E}">
-        <p14:creationId xmlns:p14="http://schemas.microsoft.com/office/powerpoint/2010/main" val="2640611357"/>
+        <p14:creationId xmlns:p14="http://schemas.microsoft.com/office/powerpoint/2010/main" val="1590212331"/>
       </p:ext>
     </p:extLst>
   </p:cSld>
@@ -2054,7 +2318,7 @@
     </p:spTree>
     <p:extLst>
       <p:ext uri="{BB962C8B-B14F-4D97-AF65-F5344CB8AC3E}">
-        <p14:creationId xmlns:p14="http://schemas.microsoft.com/office/powerpoint/2010/main" val="1664514475"/>
+        <p14:creationId xmlns:p14="http://schemas.microsoft.com/office/powerpoint/2010/main" val="726796885"/>
       </p:ext>
     </p:extLst>
   </p:cSld>
@@ -2108,7 +2372,7 @@
           <a:bodyPr/>
           <a:lstStyle/>
           <a:p>
-            <a:endParaRPr lang="en-US" dirty="0"/>
+            <a:endParaRPr lang="en-US"/>
           </a:p>
         </p:txBody>
       </p:sp>
@@ -2131,6 +2395,174 @@
               <a:rPr lang="en-US" smtClean="0"/>
               <a:t>23</a:t>
             </a:fld>
+            <a:endParaRPr lang="en-US"/>
+          </a:p>
+        </p:txBody>
+      </p:sp>
+    </p:spTree>
+    <p:extLst>
+      <p:ext uri="{BB962C8B-B14F-4D97-AF65-F5344CB8AC3E}">
+        <p14:creationId xmlns:p14="http://schemas.microsoft.com/office/powerpoint/2010/main" val="2640611357"/>
+      </p:ext>
+    </p:extLst>
+  </p:cSld>
+  <p:clrMapOvr>
+    <a:masterClrMapping/>
+  </p:clrMapOvr>
+</p:notes>
+</file>
+
+<file path=ppt/notesSlides/notesSlide24.xml><?xml version="1.0" encoding="utf-8"?>
+<p:notes xmlns:a="http://schemas.openxmlformats.org/drawingml/2006/main" xmlns:r="http://schemas.openxmlformats.org/officeDocument/2006/relationships" xmlns:p="http://schemas.openxmlformats.org/presentationml/2006/main">
+  <p:cSld>
+    <p:spTree>
+      <p:nvGrpSpPr>
+        <p:cNvPr id="1" name=""/>
+        <p:cNvGrpSpPr/>
+        <p:nvPr/>
+      </p:nvGrpSpPr>
+      <p:grpSpPr>
+        <a:xfrm>
+          <a:off x="0" y="0"/>
+          <a:ext cx="0" cy="0"/>
+          <a:chOff x="0" y="0"/>
+          <a:chExt cx="0" cy="0"/>
+        </a:xfrm>
+      </p:grpSpPr>
+      <p:sp>
+        <p:nvSpPr>
+          <p:cNvPr id="2" name="Slide Image Placeholder 1"/>
+          <p:cNvSpPr>
+            <a:spLocks noGrp="1" noRot="1" noChangeAspect="1"/>
+          </p:cNvSpPr>
+          <p:nvPr>
+            <p:ph type="sldImg"/>
+          </p:nvPr>
+        </p:nvSpPr>
+        <p:spPr/>
+      </p:sp>
+      <p:sp>
+        <p:nvSpPr>
+          <p:cNvPr id="3" name="Notes Placeholder 2"/>
+          <p:cNvSpPr>
+            <a:spLocks noGrp="1"/>
+          </p:cNvSpPr>
+          <p:nvPr>
+            <p:ph type="body" idx="1"/>
+          </p:nvPr>
+        </p:nvSpPr>
+        <p:spPr/>
+        <p:txBody>
+          <a:bodyPr/>
+          <a:lstStyle/>
+          <a:p>
+            <a:endParaRPr lang="en-US"/>
+          </a:p>
+        </p:txBody>
+      </p:sp>
+      <p:sp>
+        <p:nvSpPr>
+          <p:cNvPr id="4" name="Slide Number Placeholder 3"/>
+          <p:cNvSpPr>
+            <a:spLocks noGrp="1"/>
+          </p:cNvSpPr>
+          <p:nvPr>
+            <p:ph type="sldNum" sz="quarter" idx="10"/>
+          </p:nvPr>
+        </p:nvSpPr>
+        <p:spPr/>
+        <p:txBody>
+          <a:bodyPr/>
+          <a:lstStyle/>
+          <a:p>
+            <a:fld id="{0998D5BB-B127-481F-BC0A-2F77C576BB34}" type="slidenum">
+              <a:rPr lang="en-US" smtClean="0"/>
+              <a:t>24</a:t>
+            </a:fld>
+            <a:endParaRPr lang="en-US"/>
+          </a:p>
+        </p:txBody>
+      </p:sp>
+    </p:spTree>
+    <p:extLst>
+      <p:ext uri="{BB962C8B-B14F-4D97-AF65-F5344CB8AC3E}">
+        <p14:creationId xmlns:p14="http://schemas.microsoft.com/office/powerpoint/2010/main" val="1664514475"/>
+      </p:ext>
+    </p:extLst>
+  </p:cSld>
+  <p:clrMapOvr>
+    <a:masterClrMapping/>
+  </p:clrMapOvr>
+</p:notes>
+</file>
+
+<file path=ppt/notesSlides/notesSlide25.xml><?xml version="1.0" encoding="utf-8"?>
+<p:notes xmlns:a="http://schemas.openxmlformats.org/drawingml/2006/main" xmlns:r="http://schemas.openxmlformats.org/officeDocument/2006/relationships" xmlns:p="http://schemas.openxmlformats.org/presentationml/2006/main">
+  <p:cSld>
+    <p:spTree>
+      <p:nvGrpSpPr>
+        <p:cNvPr id="1" name=""/>
+        <p:cNvGrpSpPr/>
+        <p:nvPr/>
+      </p:nvGrpSpPr>
+      <p:grpSpPr>
+        <a:xfrm>
+          <a:off x="0" y="0"/>
+          <a:ext cx="0" cy="0"/>
+          <a:chOff x="0" y="0"/>
+          <a:chExt cx="0" cy="0"/>
+        </a:xfrm>
+      </p:grpSpPr>
+      <p:sp>
+        <p:nvSpPr>
+          <p:cNvPr id="2" name="Slide Image Placeholder 1"/>
+          <p:cNvSpPr>
+            <a:spLocks noGrp="1" noRot="1" noChangeAspect="1"/>
+          </p:cNvSpPr>
+          <p:nvPr>
+            <p:ph type="sldImg"/>
+          </p:nvPr>
+        </p:nvSpPr>
+        <p:spPr/>
+      </p:sp>
+      <p:sp>
+        <p:nvSpPr>
+          <p:cNvPr id="3" name="Notes Placeholder 2"/>
+          <p:cNvSpPr>
+            <a:spLocks noGrp="1"/>
+          </p:cNvSpPr>
+          <p:nvPr>
+            <p:ph type="body" idx="1"/>
+          </p:nvPr>
+        </p:nvSpPr>
+        <p:spPr/>
+        <p:txBody>
+          <a:bodyPr/>
+          <a:lstStyle/>
+          <a:p>
+            <a:endParaRPr lang="en-US" dirty="0"/>
+          </a:p>
+        </p:txBody>
+      </p:sp>
+      <p:sp>
+        <p:nvSpPr>
+          <p:cNvPr id="4" name="Slide Number Placeholder 3"/>
+          <p:cNvSpPr>
+            <a:spLocks noGrp="1"/>
+          </p:cNvSpPr>
+          <p:nvPr>
+            <p:ph type="sldNum" sz="quarter" idx="10"/>
+          </p:nvPr>
+        </p:nvSpPr>
+        <p:spPr/>
+        <p:txBody>
+          <a:bodyPr/>
+          <a:lstStyle/>
+          <a:p>
+            <a:fld id="{0998D5BB-B127-481F-BC0A-2F77C576BB34}" type="slidenum">
+              <a:rPr lang="en-US" smtClean="0"/>
+              <a:t>25</a:t>
+            </a:fld>
             <a:endParaRPr lang="en-US" dirty="0"/>
           </a:p>
         </p:txBody>
@@ -2148,7 +2580,7 @@
 </p:notes>
 </file>
 
-<file path=ppt/notesSlides/notesSlide24.xml><?xml version="1.0" encoding="utf-8"?>
+<file path=ppt/notesSlides/notesSlide26.xml><?xml version="1.0" encoding="utf-8"?>
 <p:notes xmlns:a="http://schemas.openxmlformats.org/drawingml/2006/main" xmlns:r="http://schemas.openxmlformats.org/officeDocument/2006/relationships" xmlns:p="http://schemas.openxmlformats.org/presentationml/2006/main">
   <p:cSld>
     <p:spTree>
@@ -2255,7 +2687,7 @@
                   <a:prstClr val="black"/>
                 </a:solidFill>
               </a:rPr>
-              <a:t>9/8/2020 3:48 PM</a:t>
+              <a:t>10/23/2021 8:45 PM</a:t>
             </a:fld>
             <a:endParaRPr lang="en-US" dirty="0">
               <a:solidFill>
@@ -2287,7 +2719,7 @@
                 </a:solidFill>
               </a:rPr>
               <a:pPr/>
-              <a:t>24</a:t>
+              <a:t>26</a:t>
             </a:fld>
             <a:endParaRPr lang="en-US" dirty="0">
               <a:solidFill>
@@ -3014,26 +3446,13 @@
                 <a:latin typeface="Consolas" panose="020B0609020204030204" pitchFamily="49" charset="0"/>
               </a:rPr>
             </a:br>
-            <a:r>
-              <a:rPr lang="en-US" b="0" dirty="0">
-                <a:solidFill>
-                  <a:srgbClr val="0451A5"/>
-                </a:solidFill>
-                <a:effectLst/>
-                <a:latin typeface="Consolas" panose="020B0609020204030204" pitchFamily="49" charset="0"/>
-              </a:rPr>
-              <a:t>7.</a:t>
-            </a:r>
-            <a:r>
-              <a:rPr lang="en-US" b="0" dirty="0">
-                <a:solidFill>
-                  <a:srgbClr val="000000"/>
-                </a:solidFill>
-                <a:effectLst/>
-                <a:latin typeface="Consolas" panose="020B0609020204030204" pitchFamily="49" charset="0"/>
-              </a:rPr>
-              <a:t> Our developers and administrators are very familiar with PostgreSQL and want to use this as the primary relational database on-premises and in Azure. We are concerned about performance in Azure, however--because we will collect data from all of our factories, we would like to have a solution which allows us to scale out our PostgreSQL services easily.</a:t>
-            </a:r>
+            <a:endParaRPr lang="en-US" b="0" dirty="0">
+              <a:solidFill>
+                <a:srgbClr val="000000"/>
+              </a:solidFill>
+              <a:effectLst/>
+              <a:latin typeface="Consolas" panose="020B0609020204030204" pitchFamily="49" charset="0"/>
+            </a:endParaRPr>
           </a:p>
           <a:p>
             <a:endParaRPr lang="en-US" dirty="0"/>
@@ -16642,12 +17061,55 @@
           <a:chExt cx="0" cy="0"/>
         </a:xfrm>
       </p:grpSpPr>
+      <p:sp>
+        <p:nvSpPr>
+          <p:cNvPr id="2" name="Title 1"/>
+          <p:cNvSpPr>
+            <a:spLocks noGrp="1"/>
+          </p:cNvSpPr>
+          <p:nvPr>
+            <p:ph type="title"/>
+          </p:nvPr>
+        </p:nvSpPr>
+        <p:spPr/>
+        <p:txBody>
+          <a:bodyPr>
+            <a:normAutofit fontScale="90000"/>
+          </a:bodyPr>
+          <a:lstStyle/>
+          <a:p>
+            <a:r>
+              <a:rPr lang="en-US" sz="4900" dirty="0">
+                <a:solidFill>
+                  <a:schemeClr val="tx1"/>
+                </a:solidFill>
+                <a:cs typeface="Segoe UI" panose="020B0502040204020203" pitchFamily="34" charset="0"/>
+              </a:rPr>
+              <a:t>Preferred solution</a:t>
+            </a:r>
+            <a:br>
+              <a:rPr lang="en-US" dirty="0">
+                <a:solidFill>
+                  <a:schemeClr val="tx1"/>
+                </a:solidFill>
+                <a:latin typeface="Segoe UI" panose="020B0502040204020203" pitchFamily="34" charset="0"/>
+              </a:rPr>
+            </a:br>
+            <a:endParaRPr lang="en-US" sz="3236" dirty="0">
+              <a:solidFill>
+                <a:schemeClr val="tx1"/>
+              </a:solidFill>
+              <a:latin typeface="Segoe UI" panose="020B0502040204020203" pitchFamily="34" charset="0"/>
+            </a:endParaRPr>
+          </a:p>
+        </p:txBody>
+      </p:sp>
       <p:pic>
         <p:nvPicPr>
-          <p:cNvPr id="5" name="Picture 4" descr="The high-level architecture for the solution.  Devices send messages to IoT Hub, which sends those messages along using an event processor pattern to enrich the telemetry data with predictive maintenance and anomaly detection, landing the data in Azure PostgreSQL Hyperscale.">
+          <p:cNvPr id="4" name="Picture 3" descr="An architecture diagram showing the preferred solution.">
             <a:extLst>
               <a:ext uri="{FF2B5EF4-FFF2-40B4-BE49-F238E27FC236}">
-                <a16:creationId xmlns:a16="http://schemas.microsoft.com/office/drawing/2014/main" id="{483238ED-37D5-42A6-B6DF-94C40C679F40}"/>
+                <a16:creationId xmlns:a16="http://schemas.microsoft.com/office/drawing/2014/main" id="{33C6AEF0-EFB3-43DE-9517-49AABE267D99}"/>
               </a:ext>
             </a:extLst>
           </p:cNvPr>
@@ -16670,57 +17132,14 @@
         </p:blipFill>
         <p:spPr>
           <a:xfrm>
-            <a:off x="1041538" y="1137702"/>
-            <a:ext cx="10108924" cy="5690106"/>
+            <a:off x="534691" y="1189176"/>
+            <a:ext cx="11122617" cy="5028930"/>
           </a:xfrm>
           <a:prstGeom prst="rect">
             <a:avLst/>
           </a:prstGeom>
         </p:spPr>
       </p:pic>
-      <p:sp>
-        <p:nvSpPr>
-          <p:cNvPr id="2" name="Title 1"/>
-          <p:cNvSpPr>
-            <a:spLocks noGrp="1"/>
-          </p:cNvSpPr>
-          <p:nvPr>
-            <p:ph type="title"/>
-          </p:nvPr>
-        </p:nvSpPr>
-        <p:spPr/>
-        <p:txBody>
-          <a:bodyPr>
-            <a:normAutofit fontScale="90000"/>
-          </a:bodyPr>
-          <a:lstStyle/>
-          <a:p>
-            <a:r>
-              <a:rPr lang="en-US" sz="4900" dirty="0">
-                <a:solidFill>
-                  <a:schemeClr val="tx1"/>
-                </a:solidFill>
-                <a:cs typeface="Segoe UI" panose="020B0502040204020203" pitchFamily="34" charset="0"/>
-              </a:rPr>
-              <a:t>Preferred solution</a:t>
-            </a:r>
-            <a:br>
-              <a:rPr lang="en-US" dirty="0">
-                <a:solidFill>
-                  <a:schemeClr val="tx1"/>
-                </a:solidFill>
-                <a:latin typeface="Segoe UI" panose="020B0502040204020203" pitchFamily="34" charset="0"/>
-              </a:rPr>
-            </a:br>
-            <a:endParaRPr lang="en-US" sz="3236" dirty="0">
-              <a:solidFill>
-                <a:schemeClr val="tx1"/>
-              </a:solidFill>
-              <a:latin typeface="Segoe UI" panose="020B0502040204020203" pitchFamily="34" charset="0"/>
-            </a:endParaRPr>
-          </a:p>
-        </p:txBody>
-      </p:sp>
     </p:spTree>
     <p:extLst>
       <p:ext uri="{BB962C8B-B14F-4D97-AF65-F5344CB8AC3E}">
@@ -16761,7 +17180,92 @@
       </p:grpSpPr>
       <p:sp>
         <p:nvSpPr>
-          <p:cNvPr id="3" name="Content Placeholder 2"/>
+          <p:cNvPr id="2" name="Title 1"/>
+          <p:cNvSpPr>
+            <a:spLocks noGrp="1"/>
+          </p:cNvSpPr>
+          <p:nvPr>
+            <p:ph type="title"/>
+          </p:nvPr>
+        </p:nvSpPr>
+        <p:spPr/>
+        <p:txBody>
+          <a:bodyPr>
+            <a:normAutofit fontScale="90000"/>
+          </a:bodyPr>
+          <a:lstStyle/>
+          <a:p>
+            <a:r>
+              <a:rPr lang="en-US" sz="4900" dirty="0">
+                <a:solidFill>
+                  <a:schemeClr val="tx1"/>
+                </a:solidFill>
+                <a:cs typeface="Segoe UI" panose="020B0502040204020203" pitchFamily="34" charset="0"/>
+              </a:rPr>
+              <a:t>Preferred solution - 1</a:t>
+            </a:r>
+            <a:br>
+              <a:rPr lang="en-US" dirty="0">
+                <a:solidFill>
+                  <a:schemeClr val="tx1"/>
+                </a:solidFill>
+                <a:latin typeface="Segoe UI" panose="020B0502040204020203" pitchFamily="34" charset="0"/>
+              </a:rPr>
+            </a:br>
+            <a:endParaRPr lang="en-US" sz="3236" dirty="0">
+              <a:solidFill>
+                <a:schemeClr val="tx1"/>
+              </a:solidFill>
+              <a:latin typeface="Segoe UI" panose="020B0502040204020203" pitchFamily="34" charset="0"/>
+            </a:endParaRPr>
+          </a:p>
+        </p:txBody>
+      </p:sp>
+      <p:pic>
+        <p:nvPicPr>
+          <p:cNvPr id="5" name="Picture 4" descr="Reading data from IoT Hub, processing via Azure Function, and writing into Cosmos DB.">
+            <a:extLst>
+              <a:ext uri="{FF2B5EF4-FFF2-40B4-BE49-F238E27FC236}">
+                <a16:creationId xmlns:a16="http://schemas.microsoft.com/office/drawing/2014/main" id="{2F61D2AA-41BE-481F-B8C0-7D7134736072}"/>
+              </a:ext>
+            </a:extLst>
+          </p:cNvPr>
+          <p:cNvPicPr>
+            <a:picLocks noChangeAspect="1"/>
+          </p:cNvPicPr>
+          <p:nvPr/>
+        </p:nvPicPr>
+        <p:blipFill>
+          <a:blip r:embed="rId3">
+            <a:extLst>
+              <a:ext uri="{28A0092B-C50C-407E-A947-70E740481C1C}">
+                <a14:useLocalDpi xmlns:a14="http://schemas.microsoft.com/office/drawing/2010/main" val="0"/>
+              </a:ext>
+            </a:extLst>
+          </a:blip>
+          <a:stretch>
+            <a:fillRect/>
+          </a:stretch>
+        </p:blipFill>
+        <p:spPr>
+          <a:xfrm>
+            <a:off x="535609" y="1189176"/>
+            <a:ext cx="11120782" cy="2597287"/>
+          </a:xfrm>
+          <a:prstGeom prst="rect">
+            <a:avLst/>
+          </a:prstGeom>
+        </p:spPr>
+      </p:pic>
+      <p:sp>
+        <p:nvSpPr>
+          <p:cNvPr id="8" name="Content Placeholder 2">
+            <a:extLst>
+              <a:ext uri="{FF2B5EF4-FFF2-40B4-BE49-F238E27FC236}">
+                <a16:creationId xmlns:a16="http://schemas.microsoft.com/office/drawing/2014/main" id="{5FC9DEC8-73C7-4997-B1D7-FF91C12B39FC}"/>
+              </a:ext>
+            </a:extLst>
+          </p:cNvPr>
           <p:cNvSpPr>
             <a:spLocks noGrp="1"/>
           </p:cNvSpPr>
@@ -16771,8 +17275,8 @@
         </p:nvSpPr>
         <p:spPr>
           <a:xfrm>
-            <a:off x="269239" y="1189177"/>
-            <a:ext cx="11653523" cy="5272008"/>
+            <a:off x="269239" y="4025366"/>
+            <a:ext cx="11653523" cy="2654403"/>
           </a:xfrm>
         </p:spPr>
         <p:txBody>
@@ -16814,90 +17318,24 @@
               </a:rPr>
               <a:t>An Azure Function then processes events, assigns a unique entity ID, and stores results in a Cosmos DB telemetry container.</a:t>
             </a:r>
-            <a:br>
-              <a:rPr lang="en-US" sz="3000" dirty="0">
-                <a:solidFill>
-                  <a:schemeClr val="tx1"/>
-                </a:solidFill>
-              </a:rPr>
-            </a:br>
-            <a:endParaRPr lang="en-US" sz="3000" dirty="0">
-              <a:solidFill>
-                <a:schemeClr val="tx1"/>
-              </a:solidFill>
-            </a:endParaRPr>
-          </a:p>
-          <a:p>
-            <a:r>
-              <a:rPr lang="en-US" sz="3000" dirty="0">
-                <a:solidFill>
-                  <a:schemeClr val="tx1"/>
-                </a:solidFill>
-                <a:latin typeface="+mj-lt"/>
-              </a:rPr>
-              <a:t>Another Azure Function reads the telemetry container’s chang</a:t>
-            </a:r>
-            <a:r>
-              <a:rPr lang="en-US" sz="3000" dirty="0">
-                <a:solidFill>
-                  <a:schemeClr val="tx1"/>
-                </a:solidFill>
-              </a:rPr>
-              <a:t>e feed to perform data enrichment, including predictive maintenance scoring provided by a custom Azure Machine Learning model deployed on Azure Kubernetes Service.  Results are stored in an Azure Event Hub, as well as Azure PostgreSQL Hyperscale.</a:t>
-            </a:r>
-          </a:p>
-        </p:txBody>
-      </p:sp>
-      <p:sp>
-        <p:nvSpPr>
-          <p:cNvPr id="2" name="Title 1"/>
-          <p:cNvSpPr>
-            <a:spLocks noGrp="1"/>
-          </p:cNvSpPr>
-          <p:nvPr>
-            <p:ph type="title"/>
-          </p:nvPr>
-        </p:nvSpPr>
-        <p:spPr/>
-        <p:txBody>
-          <a:bodyPr>
-            <a:normAutofit/>
-          </a:bodyPr>
-          <a:lstStyle/>
-          <a:p>
-            <a:r>
-              <a:rPr lang="en-US" sz="4900" dirty="0">
-                <a:solidFill>
-                  <a:schemeClr val="tx1"/>
-                </a:solidFill>
-                <a:cs typeface="Segoe UI" panose="020B0502040204020203" pitchFamily="34" charset="0"/>
-              </a:rPr>
-              <a:t>Preferred solution</a:t>
-            </a:r>
-            <a:endParaRPr lang="en-US" sz="3236" dirty="0">
-              <a:solidFill>
-                <a:schemeClr val="tx1"/>
-              </a:solidFill>
-              <a:latin typeface="Segoe UI" panose="020B0502040204020203" pitchFamily="34" charset="0"/>
-            </a:endParaRPr>
           </a:p>
         </p:txBody>
       </p:sp>
     </p:spTree>
     <p:extLst>
       <p:ext uri="{BB962C8B-B14F-4D97-AF65-F5344CB8AC3E}">
-        <p14:creationId xmlns:p14="http://schemas.microsoft.com/office/powerpoint/2010/main" val="2371438961"/>
+        <p14:creationId xmlns:p14="http://schemas.microsoft.com/office/powerpoint/2010/main" val="1755810665"/>
       </p:ext>
     </p:extLst>
   </p:cSld>
   <p:clrMapOvr>
     <a:masterClrMapping/>
   </p:clrMapOvr>
-  <mc:AlternateContent xmlns:mc="http://schemas.openxmlformats.org/markup-compatibility/2006" xmlns:p14="http://schemas.microsoft.com/office/powerpoint/2010/main">
-    <mc:Choice Requires="p14">
+  <mc:AlternateContent xmlns:mc="http://schemas.openxmlformats.org/markup-compatibility/2006">
+    <mc:Choice xmlns:p14="http://schemas.microsoft.com/office/powerpoint/2010/main" Requires="p14">
       <p:transition p14:dur="0"/>
     </mc:Choice>
-    <mc:Fallback xmlns="">
+    <mc:Fallback>
       <p:transition/>
     </mc:Fallback>
   </mc:AlternateContent>
@@ -16933,13 +17371,13 @@
         </p:nvSpPr>
         <p:spPr>
           <a:xfrm>
-            <a:off x="269239" y="1189177"/>
-            <a:ext cx="11653523" cy="5272008"/>
+            <a:off x="269239" y="4277531"/>
+            <a:ext cx="11653523" cy="2183653"/>
           </a:xfrm>
         </p:spPr>
         <p:txBody>
           <a:bodyPr>
-            <a:normAutofit/>
+            <a:normAutofit lnSpcReduction="10000"/>
           </a:bodyPr>
           <a:lstStyle/>
           <a:p>
@@ -16950,60 +17388,16 @@
                 </a:solidFill>
                 <a:latin typeface="+mj-lt"/>
               </a:rPr>
-              <a:t>Azure Stream Analytics reads from Event Hub and uses Azure Cognitive Services to perform anomaly detection on the stream of data, storing results in a scored telemetry Cosmos DB container.</a:t>
-            </a:r>
-            <a:br>
-              <a:rPr lang="en-US" sz="3000" dirty="0">
-                <a:solidFill>
-                  <a:schemeClr val="tx1"/>
-                </a:solidFill>
-                <a:latin typeface="+mj-lt"/>
-              </a:rPr>
-            </a:br>
-            <a:endParaRPr lang="en-US" sz="3000" dirty="0">
-              <a:solidFill>
-                <a:schemeClr val="tx1"/>
-              </a:solidFill>
-              <a:latin typeface="+mj-lt"/>
-            </a:endParaRPr>
-          </a:p>
-          <a:p>
+              <a:t>Another Azure Function reads the telemetry container’s chang</a:t>
+            </a:r>
             <a:r>
               <a:rPr lang="en-US" sz="3000" dirty="0">
                 <a:solidFill>
                   <a:schemeClr val="tx1"/>
                 </a:solidFill>
               </a:rPr>
-              <a:t>An Azure Function then processes the scored telemetry change feed and stores results in Azure PostgreSQL Hyperscale.</a:t>
-            </a:r>
-            <a:br>
-              <a:rPr lang="en-US" sz="3000" dirty="0">
-                <a:solidFill>
-                  <a:schemeClr val="tx1"/>
-                </a:solidFill>
-              </a:rPr>
-            </a:br>
-            <a:endParaRPr lang="en-US" sz="3000" dirty="0">
-              <a:solidFill>
-                <a:schemeClr val="tx1"/>
-              </a:solidFill>
-            </a:endParaRPr>
-          </a:p>
-          <a:p>
-            <a:r>
-              <a:rPr lang="en-US" sz="3000" dirty="0">
-                <a:solidFill>
-                  <a:schemeClr val="tx1"/>
-                </a:solidFill>
-                <a:latin typeface="+mj-lt"/>
-              </a:rPr>
-              <a:t>Azure Synapse Analytics notebooks read from the scored telemetry analytical store to populate a SQL Pool, which then populates a Power BI dashboard.</a:t>
-            </a:r>
-            <a:endParaRPr lang="en-US" sz="3000" dirty="0">
-              <a:solidFill>
-                <a:schemeClr val="tx1"/>
-              </a:solidFill>
-            </a:endParaRPr>
+              <a:t>e feed to perform data enrichment, including predictive maintenance scoring provided by a custom Azure Machine Learning model deployed on Azure Kubernetes Service.  Results are stored in an Azure Event Hub, as well as Azure PostgreSQL Hyperscale.</a:t>
+            </a:r>
           </a:p>
         </p:txBody>
       </p:sp>
@@ -17042,21 +17436,57 @@
           </a:p>
         </p:txBody>
       </p:sp>
+      <p:pic>
+        <p:nvPicPr>
+          <p:cNvPr id="5" name="Picture 4" descr="Data comes from Cosmos DB's change feed and is enriched by an Azure ML model hosted in Azure Kubernetes Service.">
+            <a:extLst>
+              <a:ext uri="{FF2B5EF4-FFF2-40B4-BE49-F238E27FC236}">
+                <a16:creationId xmlns:a16="http://schemas.microsoft.com/office/drawing/2014/main" id="{EE96AE1B-23E5-4A05-9D82-3E817365CE7A}"/>
+              </a:ext>
+            </a:extLst>
+          </p:cNvPr>
+          <p:cNvPicPr>
+            <a:picLocks noChangeAspect="1"/>
+          </p:cNvPicPr>
+          <p:nvPr/>
+        </p:nvPicPr>
+        <p:blipFill>
+          <a:blip r:embed="rId3">
+            <a:extLst>
+              <a:ext uri="{28A0092B-C50C-407E-A947-70E740481C1C}">
+                <a14:useLocalDpi xmlns:a14="http://schemas.microsoft.com/office/drawing/2010/main" val="0"/>
+              </a:ext>
+            </a:extLst>
+          </a:blip>
+          <a:stretch>
+            <a:fillRect/>
+          </a:stretch>
+        </p:blipFill>
+        <p:spPr>
+          <a:xfrm>
+            <a:off x="968179" y="1488642"/>
+            <a:ext cx="10255642" cy="2183653"/>
+          </a:xfrm>
+          <a:prstGeom prst="rect">
+            <a:avLst/>
+          </a:prstGeom>
+        </p:spPr>
+      </p:pic>
     </p:spTree>
     <p:extLst>
       <p:ext uri="{BB962C8B-B14F-4D97-AF65-F5344CB8AC3E}">
-        <p14:creationId xmlns:p14="http://schemas.microsoft.com/office/powerpoint/2010/main" val="1947364727"/>
+        <p14:creationId xmlns:p14="http://schemas.microsoft.com/office/powerpoint/2010/main" val="2371438961"/>
       </p:ext>
     </p:extLst>
   </p:cSld>
   <p:clrMapOvr>
     <a:masterClrMapping/>
   </p:clrMapOvr>
-  <mc:AlternateContent xmlns:mc="http://schemas.openxmlformats.org/markup-compatibility/2006">
-    <mc:Choice xmlns:p14="http://schemas.microsoft.com/office/powerpoint/2010/main" Requires="p14">
+  <mc:AlternateContent xmlns:mc="http://schemas.openxmlformats.org/markup-compatibility/2006" xmlns:p14="http://schemas.microsoft.com/office/powerpoint/2010/main">
+    <mc:Choice Requires="p14">
       <p:transition p14:dur="0"/>
     </mc:Choice>
-    <mc:Fallback>
+    <mc:Fallback xmlns="">
       <p:transition/>
     </mc:Fallback>
   </mc:AlternateContent>
@@ -17092,8 +17522,8 @@
         </p:nvSpPr>
         <p:spPr>
           <a:xfrm>
-            <a:off x="269239" y="1189177"/>
-            <a:ext cx="11653523" cy="5272008"/>
+            <a:off x="269239" y="4370523"/>
+            <a:ext cx="11653523" cy="2338632"/>
           </a:xfrm>
         </p:spPr>
         <p:txBody>
@@ -17109,22 +17539,18 @@
                 </a:solidFill>
                 <a:latin typeface="+mj-lt"/>
               </a:rPr>
-              <a:t>A web application implements a microservices pattern through Docker containers deployed to </a:t>
-            </a:r>
-            <a:r>
-              <a:rPr lang="en-US" sz="3000">
+              <a:t>Azure Stream Analytics reads from Event Hub and uses Azure Cognitive Services to perform anomaly detection on the stream of data, storing results in a scored telemetry Cosmos DB container.</a:t>
+            </a:r>
+          </a:p>
+          <a:p>
+            <a:r>
+              <a:rPr lang="en-US" sz="3000" dirty="0">
                 <a:solidFill>
                   <a:schemeClr val="tx1"/>
                 </a:solidFill>
-                <a:latin typeface="+mj-lt"/>
               </a:rPr>
-              <a:t>Azure.</a:t>
-            </a:r>
-            <a:endParaRPr lang="en-US" sz="3000" dirty="0">
-              <a:solidFill>
-                <a:schemeClr val="tx1"/>
-              </a:solidFill>
-            </a:endParaRPr>
+              <a:t>An Azure Function then processes the scored telemetry change feed and stores results in Azure Cosmos DB.</a:t>
+            </a:r>
           </a:p>
         </p:txBody>
       </p:sp>
@@ -17163,21 +17589,57 @@
           </a:p>
         </p:txBody>
       </p:sp>
+      <p:pic>
+        <p:nvPicPr>
+          <p:cNvPr id="5" name="Picture 4" descr="Data comes from Cosmos DB and Stream Analytics performs anomaly detection before writing to a new container.">
+            <a:extLst>
+              <a:ext uri="{FF2B5EF4-FFF2-40B4-BE49-F238E27FC236}">
+                <a16:creationId xmlns:a16="http://schemas.microsoft.com/office/drawing/2014/main" id="{780B9F8C-EBDB-4634-8D57-BEB07024A25E}"/>
+              </a:ext>
+            </a:extLst>
+          </p:cNvPr>
+          <p:cNvPicPr>
+            <a:picLocks noChangeAspect="1"/>
+          </p:cNvPicPr>
+          <p:nvPr/>
+        </p:nvPicPr>
+        <p:blipFill>
+          <a:blip r:embed="rId3">
+            <a:extLst>
+              <a:ext uri="{28A0092B-C50C-407E-A947-70E740481C1C}">
+                <a14:useLocalDpi xmlns:a14="http://schemas.microsoft.com/office/drawing/2010/main" val="0"/>
+              </a:ext>
+            </a:extLst>
+          </a:blip>
+          <a:stretch>
+            <a:fillRect/>
+          </a:stretch>
+        </p:blipFill>
+        <p:spPr>
+          <a:xfrm>
+            <a:off x="833714" y="1168146"/>
+            <a:ext cx="10524572" cy="2783919"/>
+          </a:xfrm>
+          <a:prstGeom prst="rect">
+            <a:avLst/>
+          </a:prstGeom>
+        </p:spPr>
+      </p:pic>
     </p:spTree>
     <p:extLst>
       <p:ext uri="{BB962C8B-B14F-4D97-AF65-F5344CB8AC3E}">
-        <p14:creationId xmlns:p14="http://schemas.microsoft.com/office/powerpoint/2010/main" val="1487601596"/>
+        <p14:creationId xmlns:p14="http://schemas.microsoft.com/office/powerpoint/2010/main" val="1947364727"/>
       </p:ext>
     </p:extLst>
   </p:cSld>
   <p:clrMapOvr>
     <a:masterClrMapping/>
   </p:clrMapOvr>
-  <mc:AlternateContent xmlns:mc="http://schemas.openxmlformats.org/markup-compatibility/2006">
-    <mc:Choice xmlns:p14="http://schemas.microsoft.com/office/powerpoint/2010/main" Requires="p14">
+  <mc:AlternateContent xmlns:mc="http://schemas.openxmlformats.org/markup-compatibility/2006" xmlns:p14="http://schemas.microsoft.com/office/powerpoint/2010/main">
+    <mc:Choice Requires="p14">
       <p:transition p14:dur="0"/>
     </mc:Choice>
-    <mc:Fallback>
+    <mc:Fallback xmlns="">
       <p:transition/>
     </mc:Fallback>
   </mc:AlternateContent>
@@ -17213,8 +17675,8 @@
         </p:nvSpPr>
         <p:spPr>
           <a:xfrm>
-            <a:off x="269239" y="1189177"/>
-            <a:ext cx="11653523" cy="5272008"/>
+            <a:off x="269239" y="4881965"/>
+            <a:ext cx="11653523" cy="1579219"/>
           </a:xfrm>
         </p:spPr>
         <p:txBody>
@@ -17230,33 +17692,13 @@
                 </a:solidFill>
                 <a:latin typeface="+mj-lt"/>
               </a:rPr>
-              <a:t>WWI processes a large amount of sensor data at each factory and needs any cloud service to keep up.</a:t>
-            </a:r>
-            <a:br>
-              <a:rPr lang="en-US" sz="3000" dirty="0">
-                <a:solidFill>
-                  <a:schemeClr val="tx1"/>
-                </a:solidFill>
-                <a:latin typeface="+mj-lt"/>
-              </a:rPr>
-            </a:br>
-            <a:br>
-              <a:rPr lang="en-US" sz="3000" dirty="0">
-                <a:solidFill>
-                  <a:schemeClr val="tx1"/>
-                </a:solidFill>
-                <a:latin typeface="+mj-lt"/>
-              </a:rPr>
-            </a:br>
-            <a:r>
-              <a:rPr lang="en-US" sz="3000" dirty="0">
-                <a:solidFill>
-                  <a:schemeClr val="tx1"/>
-                </a:solidFill>
-                <a:latin typeface="+mj-lt"/>
-              </a:rPr>
-              <a:t>Azure IoT Hub can scale to 6,000 device-to-cloud send operations per unit per second, with a total of 50 IoT hubs per Azure subscription. Each IoT Hub unit can support 300,000,000 messages per day, so if we assume a device sends an update every five seconds, we can support over 17,000 devices on a single IoT Hub, or just over 868,000 in a subscription.</a:t>
-            </a:r>
+              <a:t>Azure Synapse Analytics notebooks read from the scored telemetry analytical store to populate a SQL Pool, which then populates a Power BI dashboard.</a:t>
+            </a:r>
+            <a:endParaRPr lang="en-US" sz="3000" dirty="0">
+              <a:solidFill>
+                <a:schemeClr val="tx1"/>
+              </a:solidFill>
+            </a:endParaRPr>
           </a:p>
         </p:txBody>
       </p:sp>
@@ -17273,7 +17715,7 @@
         <p:spPr/>
         <p:txBody>
           <a:bodyPr>
-            <a:normAutofit fontScale="90000"/>
+            <a:normAutofit/>
           </a:bodyPr>
           <a:lstStyle/>
           <a:p>
@@ -17284,16 +17726,8 @@
                 </a:solidFill>
                 <a:cs typeface="Segoe UI" panose="020B0502040204020203" pitchFamily="34" charset="0"/>
               </a:rPr>
-              <a:t>Preferred objections handling</a:t>
-            </a:r>
-            <a:br>
-              <a:rPr lang="en-US" dirty="0">
-                <a:solidFill>
-                  <a:schemeClr val="tx1"/>
-                </a:solidFill>
-                <a:latin typeface="Segoe UI" panose="020B0502040204020203" pitchFamily="34" charset="0"/>
-              </a:rPr>
-            </a:br>
+              <a:t>Preferred solution - 4</a:t>
+            </a:r>
             <a:endParaRPr lang="en-US" sz="3236" dirty="0">
               <a:solidFill>
                 <a:schemeClr val="tx1"/>
@@ -17303,10 +17737,46 @@
           </a:p>
         </p:txBody>
       </p:sp>
+      <p:pic>
+        <p:nvPicPr>
+          <p:cNvPr id="5" name="Picture 4" descr="Azure Synapse Analytics handles data from Synapse Link.  One of its outputs is to make data available to Power BI and ultimately the customer website.">
+            <a:extLst>
+              <a:ext uri="{FF2B5EF4-FFF2-40B4-BE49-F238E27FC236}">
+                <a16:creationId xmlns:a16="http://schemas.microsoft.com/office/drawing/2014/main" id="{9DF7BF6A-7CDC-427C-9DC2-184C0C16F604}"/>
+              </a:ext>
+            </a:extLst>
+          </p:cNvPr>
+          <p:cNvPicPr>
+            <a:picLocks noChangeAspect="1"/>
+          </p:cNvPicPr>
+          <p:nvPr/>
+        </p:nvPicPr>
+        <p:blipFill>
+          <a:blip r:embed="rId3">
+            <a:extLst>
+              <a:ext uri="{28A0092B-C50C-407E-A947-70E740481C1C}">
+                <a14:useLocalDpi xmlns:a14="http://schemas.microsoft.com/office/drawing/2010/main" val="0"/>
+              </a:ext>
+            </a:extLst>
+          </a:blip>
+          <a:stretch>
+            <a:fillRect/>
+          </a:stretch>
+        </p:blipFill>
+        <p:spPr>
+          <a:xfrm>
+            <a:off x="1408724" y="1088931"/>
+            <a:ext cx="9374552" cy="3719417"/>
+          </a:xfrm>
+          <a:prstGeom prst="rect">
+            <a:avLst/>
+          </a:prstGeom>
+        </p:spPr>
+      </p:pic>
     </p:spTree>
     <p:extLst>
       <p:ext uri="{BB962C8B-B14F-4D97-AF65-F5344CB8AC3E}">
-        <p14:creationId xmlns:p14="http://schemas.microsoft.com/office/powerpoint/2010/main" val="1275538593"/>
+        <p14:creationId xmlns:p14="http://schemas.microsoft.com/office/powerpoint/2010/main" val="3349844057"/>
       </p:ext>
     </p:extLst>
   </p:cSld>
@@ -17522,8 +17992,8 @@
         </p:nvSpPr>
         <p:spPr>
           <a:xfrm>
-            <a:off x="269239" y="1189177"/>
-            <a:ext cx="11653523" cy="5272008"/>
+            <a:off x="269239" y="5439905"/>
+            <a:ext cx="11653523" cy="1021279"/>
           </a:xfrm>
         </p:spPr>
         <p:txBody>
@@ -17537,53 +18007,15 @@
                 <a:solidFill>
                   <a:schemeClr val="tx1"/>
                 </a:solidFill>
+                <a:latin typeface="+mj-lt"/>
               </a:rPr>
-              <a:t>Does Azure have capabilities to perform anomaly detection on sensor data?  If so, how quickly could that be put into place?</a:t>
-            </a:r>
-            <a:br>
-              <a:rPr lang="en-US" sz="3000" dirty="0">
-                <a:solidFill>
-                  <a:schemeClr val="tx1"/>
-                </a:solidFill>
-              </a:rPr>
-            </a:br>
-            <a:br>
-              <a:rPr lang="en-US" sz="3000" dirty="0">
-                <a:solidFill>
-                  <a:schemeClr val="tx1"/>
-                </a:solidFill>
-              </a:rPr>
-            </a:br>
-            <a:r>
-              <a:rPr lang="en-US" sz="3000" dirty="0">
-                <a:solidFill>
-                  <a:schemeClr val="tx1"/>
-                </a:solidFill>
-              </a:rPr>
-              <a:t>Within Cognitive Services, there is an Anomaly Detector service available. This service allows customers to query a REST API or integrate directly with a client library to perform anomaly detection on time series data.</a:t>
-            </a:r>
-            <a:br>
-              <a:rPr lang="en-US" sz="3000" dirty="0">
-                <a:solidFill>
-                  <a:schemeClr val="tx1"/>
-                </a:solidFill>
-              </a:rPr>
-            </a:br>
-            <a:br>
-              <a:rPr lang="en-US" sz="3000" dirty="0">
-                <a:solidFill>
-                  <a:schemeClr val="tx1"/>
-                </a:solidFill>
-              </a:rPr>
-            </a:br>
-            <a:r>
-              <a:rPr lang="en-US" sz="3000" dirty="0">
-                <a:solidFill>
-                  <a:schemeClr val="tx1"/>
-                </a:solidFill>
-              </a:rPr>
-              <a:t>Furthermore, this anomaly detection engine is built into Azure Stream Analytics, allowing you to perform Changepoint and Spike-and-Dip anomaly detection with streamed data.</a:t>
-            </a:r>
+              <a:t>A web application implements a microservices pattern through Docker containers deployed to Azure.</a:t>
+            </a:r>
+            <a:endParaRPr lang="en-US" sz="3000" dirty="0">
+              <a:solidFill>
+                <a:schemeClr val="tx1"/>
+              </a:solidFill>
+            </a:endParaRPr>
           </a:p>
         </p:txBody>
       </p:sp>
@@ -17600,7 +18032,7 @@
         <p:spPr/>
         <p:txBody>
           <a:bodyPr>
-            <a:normAutofit fontScale="90000"/>
+            <a:normAutofit/>
           </a:bodyPr>
           <a:lstStyle/>
           <a:p>
@@ -17611,16 +18043,8 @@
                 </a:solidFill>
                 <a:cs typeface="Segoe UI" panose="020B0502040204020203" pitchFamily="34" charset="0"/>
               </a:rPr>
-              <a:t>Preferred objections handling - 2</a:t>
-            </a:r>
-            <a:br>
-              <a:rPr lang="en-US" dirty="0">
-                <a:solidFill>
-                  <a:schemeClr val="tx1"/>
-                </a:solidFill>
-                <a:latin typeface="Segoe UI" panose="020B0502040204020203" pitchFamily="34" charset="0"/>
-              </a:rPr>
-            </a:br>
+              <a:t>Preferred solution - 5</a:t>
+            </a:r>
             <a:endParaRPr lang="en-US" sz="3236" dirty="0">
               <a:solidFill>
                 <a:schemeClr val="tx1"/>
@@ -17630,10 +18054,46 @@
           </a:p>
         </p:txBody>
       </p:sp>
+      <p:pic>
+        <p:nvPicPr>
+          <p:cNvPr id="5" name="Picture 4" descr="The microservices architecture.">
+            <a:extLst>
+              <a:ext uri="{FF2B5EF4-FFF2-40B4-BE49-F238E27FC236}">
+                <a16:creationId xmlns:a16="http://schemas.microsoft.com/office/drawing/2014/main" id="{E2C337D1-0F98-4520-81DC-D9BB15CAC038}"/>
+              </a:ext>
+            </a:extLst>
+          </p:cNvPr>
+          <p:cNvPicPr>
+            <a:picLocks noChangeAspect="1"/>
+          </p:cNvPicPr>
+          <p:nvPr/>
+        </p:nvPicPr>
+        <p:blipFill>
+          <a:blip r:embed="rId3">
+            <a:extLst>
+              <a:ext uri="{28A0092B-C50C-407E-A947-70E740481C1C}">
+                <a14:useLocalDpi xmlns:a14="http://schemas.microsoft.com/office/drawing/2010/main" val="0"/>
+              </a:ext>
+            </a:extLst>
+          </a:blip>
+          <a:stretch>
+            <a:fillRect/>
+          </a:stretch>
+        </p:blipFill>
+        <p:spPr>
+          <a:xfrm>
+            <a:off x="1349320" y="1197194"/>
+            <a:ext cx="9493360" cy="4242711"/>
+          </a:xfrm>
+          <a:prstGeom prst="rect">
+            <a:avLst/>
+          </a:prstGeom>
+        </p:spPr>
+      </p:pic>
     </p:spTree>
     <p:extLst>
       <p:ext uri="{BB962C8B-B14F-4D97-AF65-F5344CB8AC3E}">
-        <p14:creationId xmlns:p14="http://schemas.microsoft.com/office/powerpoint/2010/main" val="1176169307"/>
+        <p14:creationId xmlns:p14="http://schemas.microsoft.com/office/powerpoint/2010/main" val="1487601596"/>
       </p:ext>
     </p:extLst>
   </p:cSld>
@@ -17697,7 +18157,7 @@
                 </a:solidFill>
                 <a:latin typeface="+mj-lt"/>
               </a:rPr>
-              <a:t>Will a hybrid Azure and on-premises solution require additional administrators?</a:t>
+              <a:t>WWI processes a large amount of sensor data at each factory and needs any cloud service to keep up.</a:t>
             </a:r>
             <a:br>
               <a:rPr lang="en-US" sz="3000" dirty="0">
@@ -17722,7 +18182,7 @@
                 </a:solidFill>
                 <a:latin typeface="+mj-lt"/>
               </a:rPr>
-              <a:t>With the proposed solution, this new architecture will not require additional administrators. Replacing Apache Kafka with IoT Hub would take Wide World Importers from a self-hosted system with significant maintenance requirements to a Platform-as-a-Service solution with little maintenance. Relying heavily on Platform-as-a-Service technologies like Azure Database for PostgreSQL, Cosmos DB, and Azure Machine Learning enable developer solutions without burdening administrators.</a:t>
+              <a:t>Azure IoT Hub can scale to 6,000 device-to-cloud send operations per unit per second, with a total of 50 IoT hubs per Azure subscription. Each IoT Hub unit can support 300,000,000 messages per day, so if we assume a device sends an update every five seconds, we can support over 17,000 devices on a single IoT Hub, or just over 868,000 in a subscription.</a:t>
             </a:r>
           </a:p>
         </p:txBody>
@@ -17751,7 +18211,7 @@
                 </a:solidFill>
                 <a:cs typeface="Segoe UI" panose="020B0502040204020203" pitchFamily="34" charset="0"/>
               </a:rPr>
-              <a:t>Preferred objections handling - 3</a:t>
+              <a:t>Preferred objections handling</a:t>
             </a:r>
             <a:br>
               <a:rPr lang="en-US" dirty="0">
@@ -17773,7 +18233,7 @@
     </p:spTree>
     <p:extLst>
       <p:ext uri="{BB962C8B-B14F-4D97-AF65-F5344CB8AC3E}">
-        <p14:creationId xmlns:p14="http://schemas.microsoft.com/office/powerpoint/2010/main" val="2862928784"/>
+        <p14:creationId xmlns:p14="http://schemas.microsoft.com/office/powerpoint/2010/main" val="1275538593"/>
       </p:ext>
     </p:extLst>
   </p:cSld>
@@ -17836,6 +18296,304 @@
                   <a:schemeClr val="tx1"/>
                 </a:solidFill>
               </a:rPr>
+              <a:t>Does Azure have capabilities to perform anomaly detection on sensor data?  If so, how quickly could that be put into place?</a:t>
+            </a:r>
+            <a:br>
+              <a:rPr lang="en-US" sz="3000" dirty="0">
+                <a:solidFill>
+                  <a:schemeClr val="tx1"/>
+                </a:solidFill>
+              </a:rPr>
+            </a:br>
+            <a:br>
+              <a:rPr lang="en-US" sz="3000" dirty="0">
+                <a:solidFill>
+                  <a:schemeClr val="tx1"/>
+                </a:solidFill>
+              </a:rPr>
+            </a:br>
+            <a:r>
+              <a:rPr lang="en-US" sz="3000" dirty="0">
+                <a:solidFill>
+                  <a:schemeClr val="tx1"/>
+                </a:solidFill>
+              </a:rPr>
+              <a:t>Within Cognitive Services, there is an Anomaly Detector service available. This service allows customers to query a REST API or integrate directly with a client library to perform anomaly detection on time series data.</a:t>
+            </a:r>
+            <a:br>
+              <a:rPr lang="en-US" sz="3000" dirty="0">
+                <a:solidFill>
+                  <a:schemeClr val="tx1"/>
+                </a:solidFill>
+              </a:rPr>
+            </a:br>
+            <a:br>
+              <a:rPr lang="en-US" sz="3000" dirty="0">
+                <a:solidFill>
+                  <a:schemeClr val="tx1"/>
+                </a:solidFill>
+              </a:rPr>
+            </a:br>
+            <a:r>
+              <a:rPr lang="en-US" sz="3000" dirty="0">
+                <a:solidFill>
+                  <a:schemeClr val="tx1"/>
+                </a:solidFill>
+              </a:rPr>
+              <a:t>Furthermore, this anomaly detection engine is built into Azure Stream Analytics, allowing you to perform Changepoint and Spike-and-Dip anomaly detection with streamed data.</a:t>
+            </a:r>
+          </a:p>
+        </p:txBody>
+      </p:sp>
+      <p:sp>
+        <p:nvSpPr>
+          <p:cNvPr id="2" name="Title 1"/>
+          <p:cNvSpPr>
+            <a:spLocks noGrp="1"/>
+          </p:cNvSpPr>
+          <p:nvPr>
+            <p:ph type="title"/>
+          </p:nvPr>
+        </p:nvSpPr>
+        <p:spPr/>
+        <p:txBody>
+          <a:bodyPr>
+            <a:normAutofit fontScale="90000"/>
+          </a:bodyPr>
+          <a:lstStyle/>
+          <a:p>
+            <a:r>
+              <a:rPr lang="en-US" sz="4900" dirty="0">
+                <a:solidFill>
+                  <a:schemeClr val="tx1"/>
+                </a:solidFill>
+                <a:cs typeface="Segoe UI" panose="020B0502040204020203" pitchFamily="34" charset="0"/>
+              </a:rPr>
+              <a:t>Preferred objections handling - 2</a:t>
+            </a:r>
+            <a:br>
+              <a:rPr lang="en-US" dirty="0">
+                <a:solidFill>
+                  <a:schemeClr val="tx1"/>
+                </a:solidFill>
+                <a:latin typeface="Segoe UI" panose="020B0502040204020203" pitchFamily="34" charset="0"/>
+              </a:rPr>
+            </a:br>
+            <a:endParaRPr lang="en-US" sz="3236" dirty="0">
+              <a:solidFill>
+                <a:schemeClr val="tx1"/>
+              </a:solidFill>
+              <a:latin typeface="Segoe UI" panose="020B0502040204020203" pitchFamily="34" charset="0"/>
+            </a:endParaRPr>
+          </a:p>
+        </p:txBody>
+      </p:sp>
+    </p:spTree>
+    <p:extLst>
+      <p:ext uri="{BB962C8B-B14F-4D97-AF65-F5344CB8AC3E}">
+        <p14:creationId xmlns:p14="http://schemas.microsoft.com/office/powerpoint/2010/main" val="1176169307"/>
+      </p:ext>
+    </p:extLst>
+  </p:cSld>
+  <p:clrMapOvr>
+    <a:masterClrMapping/>
+  </p:clrMapOvr>
+  <mc:AlternateContent xmlns:mc="http://schemas.openxmlformats.org/markup-compatibility/2006" xmlns:p14="http://schemas.microsoft.com/office/powerpoint/2010/main">
+    <mc:Choice Requires="p14">
+      <p:transition p14:dur="0"/>
+    </mc:Choice>
+    <mc:Fallback xmlns="">
+      <p:transition/>
+    </mc:Fallback>
+  </mc:AlternateContent>
+</p:sld>
+</file>
+
+<file path=ppt/slides/slide23.xml><?xml version="1.0" encoding="utf-8"?>
+<p:sld xmlns:a="http://schemas.openxmlformats.org/drawingml/2006/main" xmlns:r="http://schemas.openxmlformats.org/officeDocument/2006/relationships" xmlns:p="http://schemas.openxmlformats.org/presentationml/2006/main">
+  <p:cSld>
+    <p:spTree>
+      <p:nvGrpSpPr>
+        <p:cNvPr id="1" name=""/>
+        <p:cNvGrpSpPr/>
+        <p:nvPr/>
+      </p:nvGrpSpPr>
+      <p:grpSpPr>
+        <a:xfrm>
+          <a:off x="0" y="0"/>
+          <a:ext cx="0" cy="0"/>
+          <a:chOff x="0" y="0"/>
+          <a:chExt cx="0" cy="0"/>
+        </a:xfrm>
+      </p:grpSpPr>
+      <p:sp>
+        <p:nvSpPr>
+          <p:cNvPr id="3" name="Content Placeholder 2"/>
+          <p:cNvSpPr>
+            <a:spLocks noGrp="1"/>
+          </p:cNvSpPr>
+          <p:nvPr>
+            <p:ph type="body" sz="quarter" idx="10"/>
+          </p:nvPr>
+        </p:nvSpPr>
+        <p:spPr>
+          <a:xfrm>
+            <a:off x="269239" y="1189177"/>
+            <a:ext cx="11653523" cy="5272008"/>
+          </a:xfrm>
+        </p:spPr>
+        <p:txBody>
+          <a:bodyPr>
+            <a:normAutofit/>
+          </a:bodyPr>
+          <a:lstStyle/>
+          <a:p>
+            <a:r>
+              <a:rPr lang="en-US" sz="3000" dirty="0">
+                <a:solidFill>
+                  <a:schemeClr val="tx1"/>
+                </a:solidFill>
+                <a:latin typeface="+mj-lt"/>
+              </a:rPr>
+              <a:t>Will a hybrid Azure and on-premises solution require additional administrators?</a:t>
+            </a:r>
+            <a:br>
+              <a:rPr lang="en-US" sz="3000" dirty="0">
+                <a:solidFill>
+                  <a:schemeClr val="tx1"/>
+                </a:solidFill>
+                <a:latin typeface="+mj-lt"/>
+              </a:rPr>
+            </a:br>
+            <a:br>
+              <a:rPr lang="en-US" sz="3000" dirty="0">
+                <a:solidFill>
+                  <a:schemeClr val="tx1"/>
+                </a:solidFill>
+                <a:latin typeface="+mj-lt"/>
+              </a:rPr>
+            </a:br>
+            <a:r>
+              <a:rPr lang="en-US" sz="3000" dirty="0">
+                <a:solidFill>
+                  <a:schemeClr val="tx1"/>
+                </a:solidFill>
+                <a:latin typeface="+mj-lt"/>
+              </a:rPr>
+              <a:t>With the proposed solution, this new architecture will not require additional administrators. Replacing Apache Kafka with IoT Hub would take Wide World Importers from a self-hosted system with significant maintenance requirements to a Platform-as-a-Service solution with little maintenance. Relying heavily on Platform-as-a-Service technologies like Azure Database for PostgreSQL, Cosmos DB, and Azure Machine Learning enable developer solutions without burdening administrators.</a:t>
+            </a:r>
+          </a:p>
+        </p:txBody>
+      </p:sp>
+      <p:sp>
+        <p:nvSpPr>
+          <p:cNvPr id="2" name="Title 1"/>
+          <p:cNvSpPr>
+            <a:spLocks noGrp="1"/>
+          </p:cNvSpPr>
+          <p:nvPr>
+            <p:ph type="title"/>
+          </p:nvPr>
+        </p:nvSpPr>
+        <p:spPr/>
+        <p:txBody>
+          <a:bodyPr>
+            <a:normAutofit fontScale="90000"/>
+          </a:bodyPr>
+          <a:lstStyle/>
+          <a:p>
+            <a:r>
+              <a:rPr lang="en-US" sz="4900" dirty="0">
+                <a:solidFill>
+                  <a:schemeClr val="tx1"/>
+                </a:solidFill>
+                <a:cs typeface="Segoe UI" panose="020B0502040204020203" pitchFamily="34" charset="0"/>
+              </a:rPr>
+              <a:t>Preferred objections handling - 3</a:t>
+            </a:r>
+            <a:br>
+              <a:rPr lang="en-US" dirty="0">
+                <a:solidFill>
+                  <a:schemeClr val="tx1"/>
+                </a:solidFill>
+                <a:latin typeface="Segoe UI" panose="020B0502040204020203" pitchFamily="34" charset="0"/>
+              </a:rPr>
+            </a:br>
+            <a:endParaRPr lang="en-US" sz="3236" dirty="0">
+              <a:solidFill>
+                <a:schemeClr val="tx1"/>
+              </a:solidFill>
+              <a:latin typeface="Segoe UI" panose="020B0502040204020203" pitchFamily="34" charset="0"/>
+            </a:endParaRPr>
+          </a:p>
+        </p:txBody>
+      </p:sp>
+    </p:spTree>
+    <p:extLst>
+      <p:ext uri="{BB962C8B-B14F-4D97-AF65-F5344CB8AC3E}">
+        <p14:creationId xmlns:p14="http://schemas.microsoft.com/office/powerpoint/2010/main" val="2862928784"/>
+      </p:ext>
+    </p:extLst>
+  </p:cSld>
+  <p:clrMapOvr>
+    <a:masterClrMapping/>
+  </p:clrMapOvr>
+  <mc:AlternateContent xmlns:mc="http://schemas.openxmlformats.org/markup-compatibility/2006" xmlns:p14="http://schemas.microsoft.com/office/powerpoint/2010/main">
+    <mc:Choice Requires="p14">
+      <p:transition p14:dur="0"/>
+    </mc:Choice>
+    <mc:Fallback xmlns="">
+      <p:transition/>
+    </mc:Fallback>
+  </mc:AlternateContent>
+</p:sld>
+</file>
+
+<file path=ppt/slides/slide24.xml><?xml version="1.0" encoding="utf-8"?>
+<p:sld xmlns:a="http://schemas.openxmlformats.org/drawingml/2006/main" xmlns:r="http://schemas.openxmlformats.org/officeDocument/2006/relationships" xmlns:p="http://schemas.openxmlformats.org/presentationml/2006/main">
+  <p:cSld>
+    <p:spTree>
+      <p:nvGrpSpPr>
+        <p:cNvPr id="1" name=""/>
+        <p:cNvGrpSpPr/>
+        <p:nvPr/>
+      </p:nvGrpSpPr>
+      <p:grpSpPr>
+        <a:xfrm>
+          <a:off x="0" y="0"/>
+          <a:ext cx="0" cy="0"/>
+          <a:chOff x="0" y="0"/>
+          <a:chExt cx="0" cy="0"/>
+        </a:xfrm>
+      </p:grpSpPr>
+      <p:sp>
+        <p:nvSpPr>
+          <p:cNvPr id="3" name="Content Placeholder 2"/>
+          <p:cNvSpPr>
+            <a:spLocks noGrp="1"/>
+          </p:cNvSpPr>
+          <p:nvPr>
+            <p:ph type="body" sz="quarter" idx="10"/>
+          </p:nvPr>
+        </p:nvSpPr>
+        <p:spPr>
+          <a:xfrm>
+            <a:off x="269239" y="1189177"/>
+            <a:ext cx="11653523" cy="5272008"/>
+          </a:xfrm>
+        </p:spPr>
+        <p:txBody>
+          <a:bodyPr>
+            <a:normAutofit/>
+          </a:bodyPr>
+          <a:lstStyle/>
+          <a:p>
+            <a:r>
+              <a:rPr lang="en-US" sz="3000" dirty="0">
+                <a:solidFill>
+                  <a:schemeClr val="tx1"/>
+                </a:solidFill>
+              </a:rPr>
               <a:t>How quickly could WWI add new sensors to the provided solution?  New manufacturing devices are added frequently and they need a solution which scales over time.</a:t>
             </a:r>
             <a:br>
@@ -17933,7 +18691,7 @@
 </p:sld>
 </file>
 
-<file path=ppt/slides/slide23.xml><?xml version="1.0" encoding="utf-8"?>
+<file path=ppt/slides/slide25.xml><?xml version="1.0" encoding="utf-8"?>
 <p:sld xmlns:a="http://schemas.openxmlformats.org/drawingml/2006/main" xmlns:r="http://schemas.openxmlformats.org/officeDocument/2006/relationships" xmlns:p="http://schemas.openxmlformats.org/presentationml/2006/main">
   <p:cSld>
     <p:spTree>
@@ -18100,7 +18858,7 @@
 </p:sld>
 </file>
 
-<file path=ppt/slides/slide24.xml><?xml version="1.0" encoding="utf-8"?>
+<file path=ppt/slides/slide26.xml><?xml version="1.0" encoding="utf-8"?>
 <p:sld xmlns:a="http://schemas.openxmlformats.org/drawingml/2006/main" xmlns:r="http://schemas.openxmlformats.org/officeDocument/2006/relationships" xmlns:p="http://schemas.openxmlformats.org/presentationml/2006/main">
   <p:cSld>
     <p:bg>
@@ -19151,30 +19909,6 @@
               </a:rPr>
               <a:t>Move toward a microservice approach for the website.</a:t>
             </a:r>
-          </a:p>
-          <a:p>
-            <a:r>
-              <a:rPr lang="en-US" sz="3000" dirty="0">
-                <a:solidFill>
-                  <a:schemeClr val="tx1"/>
-                </a:solidFill>
-                <a:latin typeface="+mj-lt"/>
-              </a:rPr>
-              <a:t>Enable PostgreSQL to scale out easily.</a:t>
-            </a:r>
-          </a:p>
-          <a:p>
-            <a:pPr marL="0" indent="0">
-              <a:spcAft>
-                <a:spcPts val="882"/>
-              </a:spcAft>
-              <a:buNone/>
-            </a:pPr>
-            <a:endParaRPr lang="en-US" sz="3000" dirty="0">
-              <a:solidFill>
-                <a:schemeClr val="tx1"/>
-              </a:solidFill>
-            </a:endParaRPr>
           </a:p>
         </p:txBody>
       </p:sp>
@@ -20312,6 +21046,15 @@
 </file>
 
 <file path=customXml/item1.xml><?xml version="1.0" encoding="utf-8"?>
+<p:properties xmlns:p="http://schemas.microsoft.com/office/2006/metadata/properties" xmlns:xsi="http://www.w3.org/2001/XMLSchema-instance" xmlns:pc="http://schemas.microsoft.com/office/infopath/2007/PartnerControls">
+  <documentManagement>
+    <_ip_UnifiedCompliancePolicyUIAction xmlns="http://schemas.microsoft.com/sharepoint/v3" xsi:nil="true"/>
+    <_ip_UnifiedCompliancePolicyProperties xmlns="http://schemas.microsoft.com/sharepoint/v3" xsi:nil="true"/>
+  </documentManagement>
+</p:properties>
+</file>
+
+<file path=customXml/item2.xml><?xml version="1.0" encoding="utf-8"?>
 <ct:contentTypeSchema xmlns:ct="http://schemas.microsoft.com/office/2006/metadata/contentType" xmlns:ma="http://schemas.microsoft.com/office/2006/metadata/properties/metaAttributes" ct:_="" ma:_="" ma:contentTypeName="Document" ma:contentTypeID="0x010100D15DFA3690A15B4081582BBCC6BEAC3E" ma:contentTypeVersion="9" ma:contentTypeDescription="Create a new document." ma:contentTypeScope="" ma:versionID="642da1784587cbe85a7fdbbe4dc36103">
   <xsd:schema xmlns:xsd="http://www.w3.org/2001/XMLSchema" xmlns:xs="http://www.w3.org/2001/XMLSchema" xmlns:p="http://schemas.microsoft.com/office/2006/metadata/properties" xmlns:ns1="http://schemas.microsoft.com/sharepoint/v3" xmlns:ns2="2023ac63-7b75-4916-a9ee-591457758eee" xmlns:ns3="d9c797ad-d7c3-4982-82b7-81352a75e4a5" targetNamespace="http://schemas.microsoft.com/office/2006/metadata/properties" ma:root="true" ma:fieldsID="91198b0246576053cc55dd2c67035a89" ns1:_="" ns2:_="" ns3:_="">
     <xsd:import namespace="http://schemas.microsoft.com/sharepoint/v3"/>
@@ -20513,7 +21256,7 @@
 </ct:contentTypeSchema>
 </file>
 
-<file path=customXml/item2.xml><?xml version="1.0" encoding="utf-8"?>
+<file path=customXml/item3.xml><?xml version="1.0" encoding="utf-8"?>
 <?mso-contentType ?>
 <FormTemplates xmlns="http://schemas.microsoft.com/sharepoint/v3/contenttype/forms">
   <Display>DocumentLibraryForm</Display>
@@ -20522,16 +21265,25 @@
 </FormTemplates>
 </file>
 
-<file path=customXml/item3.xml><?xml version="1.0" encoding="utf-8"?>
-<p:properties xmlns:p="http://schemas.microsoft.com/office/2006/metadata/properties" xmlns:xsi="http://www.w3.org/2001/XMLSchema-instance" xmlns:pc="http://schemas.microsoft.com/office/infopath/2007/PartnerControls">
-  <documentManagement>
-    <_ip_UnifiedCompliancePolicyUIAction xmlns="http://schemas.microsoft.com/sharepoint/v3" xsi:nil="true"/>
-    <_ip_UnifiedCompliancePolicyProperties xmlns="http://schemas.microsoft.com/sharepoint/v3" xsi:nil="true"/>
-  </documentManagement>
-</p:properties>
+<file path=customXml/itemProps1.xml><?xml version="1.0" encoding="utf-8"?>
+<ds:datastoreItem xmlns:ds="http://schemas.openxmlformats.org/officeDocument/2006/customXml" ds:itemID="{BAF7D529-36AB-45DA-B239-2F912F2D1610}">
+  <ds:schemaRefs>
+    <ds:schemaRef ds:uri="http://schemas.microsoft.com/sharepoint/v3"/>
+    <ds:schemaRef ds:uri="http://purl.org/dc/elements/1.1/"/>
+    <ds:schemaRef ds:uri="http://schemas.microsoft.com/office/2006/metadata/properties"/>
+    <ds:schemaRef ds:uri="http://schemas.openxmlformats.org/package/2006/metadata/core-properties"/>
+    <ds:schemaRef ds:uri="http://schemas.microsoft.com/office/infopath/2007/PartnerControls"/>
+    <ds:schemaRef ds:uri="http://purl.org/dc/terms/"/>
+    <ds:schemaRef ds:uri="2023ac63-7b75-4916-a9ee-591457758eee"/>
+    <ds:schemaRef ds:uri="http://schemas.microsoft.com/office/2006/documentManagement/types"/>
+    <ds:schemaRef ds:uri="d9c797ad-d7c3-4982-82b7-81352a75e4a5"/>
+    <ds:schemaRef ds:uri="http://www.w3.org/XML/1998/namespace"/>
+    <ds:schemaRef ds:uri="http://purl.org/dc/dcmitype/"/>
+  </ds:schemaRefs>
+</ds:datastoreItem>
 </file>
 
-<file path=customXml/itemProps1.xml><?xml version="1.0" encoding="utf-8"?>
+<file path=customXml/itemProps2.xml><?xml version="1.0" encoding="utf-8"?>
 <ds:datastoreItem xmlns:ds="http://schemas.openxmlformats.org/officeDocument/2006/customXml" ds:itemID="{255F5BEB-6AD6-480A-8556-C80C5EBC10F2}">
   <ds:schemaRefs>
     <ds:schemaRef ds:uri="http://schemas.microsoft.com/office/2006/metadata/contentType"/>
@@ -20551,28 +21303,10 @@
 </ds:datastoreItem>
 </file>
 
-<file path=customXml/itemProps2.xml><?xml version="1.0" encoding="utf-8"?>
+<file path=customXml/itemProps3.xml><?xml version="1.0" encoding="utf-8"?>
 <ds:datastoreItem xmlns:ds="http://schemas.openxmlformats.org/officeDocument/2006/customXml" ds:itemID="{F18501AF-04CF-4482-BAE1-607B49DDC378}">
   <ds:schemaRefs>
     <ds:schemaRef ds:uri="http://schemas.microsoft.com/sharepoint/v3/contenttype/forms"/>
   </ds:schemaRefs>
 </ds:datastoreItem>
-</file>
-
-<file path=customXml/itemProps3.xml><?xml version="1.0" encoding="utf-8"?>
-<ds:datastoreItem xmlns:ds="http://schemas.openxmlformats.org/officeDocument/2006/customXml" ds:itemID="{BAF7D529-36AB-45DA-B239-2F912F2D1610}">
-  <ds:schemaRefs>
-    <ds:schemaRef ds:uri="http://schemas.microsoft.com/sharepoint/v3"/>
-    <ds:schemaRef ds:uri="http://purl.org/dc/elements/1.1/"/>
-    <ds:schemaRef ds:uri="http://schemas.microsoft.com/office/2006/metadata/properties"/>
-    <ds:schemaRef ds:uri="http://schemas.openxmlformats.org/package/2006/metadata/core-properties"/>
-    <ds:schemaRef ds:uri="http://schemas.microsoft.com/office/infopath/2007/PartnerControls"/>
-    <ds:schemaRef ds:uri="http://purl.org/dc/terms/"/>
-    <ds:schemaRef ds:uri="2023ac63-7b75-4916-a9ee-591457758eee"/>
-    <ds:schemaRef ds:uri="http://schemas.microsoft.com/office/2006/documentManagement/types"/>
-    <ds:schemaRef ds:uri="d9c797ad-d7c3-4982-82b7-81352a75e4a5"/>
-    <ds:schemaRef ds:uri="http://www.w3.org/XML/1998/namespace"/>
-    <ds:schemaRef ds:uri="http://purl.org/dc/dcmitype/"/>
-  </ds:schemaRefs>
-</ds:datastoreItem>
 </file>
</xml_diff>